<commit_message>
fixed the arch pptx file
Signed-off-by: Arad Halevy <arad.halevy@ibm.com>
</commit_message>
<xml_diff>
--- a/site/docs/static/Fybrik architcture.pptx
+++ b/site/docs/static/Fybrik architcture.pptx
@@ -252,7 +252,7 @@
           <a:p>
             <a:fld id="{25D3A1D4-C2F1-4FBA-9F37-B87A976340E2}" type="datetimeFigureOut">
               <a:rPr lang="en-US" smtClean="0"/>
-              <a:t>10/30/2022</a:t>
+              <a:t>3/18/2023</a:t>
             </a:fld>
             <a:endParaRPr lang="en-US"/>
           </a:p>
@@ -422,7 +422,7 @@
             <a:fld id="{5288BB53-F264-D84E-8876-073A512183CA}" type="datetimeFigureOut">
               <a:rPr lang="en-US" smtClean="0"/>
               <a:pPr/>
-              <a:t>10/30/2022</a:t>
+              <a:t>3/18/2023</a:t>
             </a:fld>
             <a:endParaRPr lang="en-US"/>
           </a:p>
@@ -816,6 +816,335 @@
           <a:bodyPr/>
           <a:lstStyle/>
           <a:p>
+            <a:endParaRPr lang="en-US" dirty="0"/>
+          </a:p>
+        </p:txBody>
+      </p:sp>
+      <p:sp>
+        <p:nvSpPr>
+          <p:cNvPr id="2" name="Text Placeholder 8">
+            <a:extLst>
+              <a:ext uri="{FF2B5EF4-FFF2-40B4-BE49-F238E27FC236}">
+                <a16:creationId xmlns:a16="http://schemas.microsoft.com/office/drawing/2014/main" id="{4B10B18B-420C-1E31-1498-1B748FFFDEF0}"/>
+              </a:ext>
+            </a:extLst>
+          </p:cNvPr>
+          <p:cNvSpPr txBox="1">
+            <a:spLocks/>
+          </p:cNvSpPr>
+          <p:nvPr userDrawn="1"/>
+        </p:nvSpPr>
+        <p:spPr>
+          <a:xfrm>
+            <a:off x="0" y="0"/>
+            <a:ext cx="14630400" cy="1371600"/>
+          </a:xfrm>
+          <a:prstGeom prst="rect">
+            <a:avLst/>
+          </a:prstGeom>
+          <a:gradFill>
+            <a:gsLst>
+              <a:gs pos="20000">
+                <a:schemeClr val="accent2"/>
+              </a:gs>
+              <a:gs pos="100000">
+                <a:schemeClr val="accent3"/>
+              </a:gs>
+            </a:gsLst>
+            <a:lin ang="13500000" scaled="1"/>
+          </a:gradFill>
+          <a:ln w="3175">
+            <a:noFill/>
+          </a:ln>
+        </p:spPr>
+        <p:txBody>
+          <a:bodyPr lIns="182880" tIns="365760" rIns="91440"/>
+          <a:lstStyle>
+            <a:lvl1pPr marL="0" indent="0" algn="l" defTabSz="457200" rtl="0" eaLnBrk="1" latinLnBrk="0" hangingPunct="1">
+              <a:lnSpc>
+                <a:spcPct val="100000"/>
+              </a:lnSpc>
+              <a:spcBef>
+                <a:spcPts val="1100"/>
+              </a:spcBef>
+              <a:buFont typeface="Arial"/>
+              <a:buNone/>
+              <a:defRPr sz="1400" kern="1200">
+                <a:solidFill>
+                  <a:schemeClr val="tx1"/>
+                </a:solidFill>
+                <a:latin typeface="Arial" charset="0"/>
+                <a:ea typeface="Arial" charset="0"/>
+                <a:cs typeface="Arial" charset="0"/>
+              </a:defRPr>
+            </a:lvl1pPr>
+            <a:lvl2pPr marL="173038" indent="-173038" algn="l" defTabSz="457200" rtl="0" eaLnBrk="1" latinLnBrk="0" hangingPunct="1">
+              <a:lnSpc>
+                <a:spcPct val="100000"/>
+              </a:lnSpc>
+              <a:spcBef>
+                <a:spcPts val="1100"/>
+              </a:spcBef>
+              <a:spcAft>
+                <a:spcPts val="0"/>
+              </a:spcAft>
+              <a:buFont typeface="Arial"/>
+              <a:buChar char="–"/>
+              <a:defRPr sz="1400" kern="1200">
+                <a:solidFill>
+                  <a:schemeClr val="tx1"/>
+                </a:solidFill>
+                <a:latin typeface="Arial" charset="0"/>
+                <a:ea typeface="Arial" charset="0"/>
+                <a:cs typeface="Arial" charset="0"/>
+              </a:defRPr>
+            </a:lvl2pPr>
+            <a:lvl3pPr marL="396875" indent="-173038" algn="l" defTabSz="457200" rtl="0" eaLnBrk="1" latinLnBrk="0" hangingPunct="1">
+              <a:lnSpc>
+                <a:spcPct val="100000"/>
+              </a:lnSpc>
+              <a:spcBef>
+                <a:spcPts val="1100"/>
+              </a:spcBef>
+              <a:spcAft>
+                <a:spcPts val="0"/>
+              </a:spcAft>
+              <a:buFont typeface="Arial"/>
+              <a:buChar char="•"/>
+              <a:defRPr sz="1400" kern="1200">
+                <a:solidFill>
+                  <a:schemeClr val="tx1"/>
+                </a:solidFill>
+                <a:latin typeface="Arial" charset="0"/>
+                <a:ea typeface="Arial" charset="0"/>
+                <a:cs typeface="Arial" charset="0"/>
+              </a:defRPr>
+            </a:lvl3pPr>
+            <a:lvl4pPr marL="625475" indent="-168275" algn="l" defTabSz="457200" rtl="0" eaLnBrk="1" latinLnBrk="0" hangingPunct="1">
+              <a:lnSpc>
+                <a:spcPct val="100000"/>
+              </a:lnSpc>
+              <a:spcBef>
+                <a:spcPts val="1100"/>
+              </a:spcBef>
+              <a:spcAft>
+                <a:spcPts val="0"/>
+              </a:spcAft>
+              <a:buFont typeface="Arial"/>
+              <a:buChar char="–"/>
+              <a:defRPr sz="1400" kern="1200">
+                <a:solidFill>
+                  <a:schemeClr val="tx1"/>
+                </a:solidFill>
+                <a:latin typeface="Arial" charset="0"/>
+                <a:ea typeface="Arial" charset="0"/>
+                <a:cs typeface="Arial" charset="0"/>
+              </a:defRPr>
+            </a:lvl4pPr>
+            <a:lvl5pPr marL="803275" indent="-173038" algn="l" defTabSz="457200" rtl="0" eaLnBrk="1" latinLnBrk="0" hangingPunct="1">
+              <a:lnSpc>
+                <a:spcPct val="100000"/>
+              </a:lnSpc>
+              <a:spcBef>
+                <a:spcPts val="1100"/>
+              </a:spcBef>
+              <a:spcAft>
+                <a:spcPts val="0"/>
+              </a:spcAft>
+              <a:buFont typeface="Arial"/>
+              <a:buChar char="»"/>
+              <a:defRPr sz="1400" kern="1200">
+                <a:solidFill>
+                  <a:schemeClr val="tx1"/>
+                </a:solidFill>
+                <a:latin typeface="Arial" charset="0"/>
+                <a:ea typeface="Arial" charset="0"/>
+                <a:cs typeface="Arial" charset="0"/>
+              </a:defRPr>
+            </a:lvl5pPr>
+            <a:lvl6pPr marL="2514600" indent="-228600" algn="l" defTabSz="457200" rtl="0" eaLnBrk="1" latinLnBrk="0" hangingPunct="1">
+              <a:spcBef>
+                <a:spcPct val="20000"/>
+              </a:spcBef>
+              <a:buFont typeface="Arial"/>
+              <a:buChar char="•"/>
+              <a:defRPr sz="2000" kern="1200">
+                <a:solidFill>
+                  <a:schemeClr val="tx1"/>
+                </a:solidFill>
+                <a:latin typeface="+mn-lt"/>
+                <a:ea typeface="+mn-ea"/>
+                <a:cs typeface="+mn-cs"/>
+              </a:defRPr>
+            </a:lvl6pPr>
+            <a:lvl7pPr marL="2971800" indent="-228600" algn="l" defTabSz="457200" rtl="0" eaLnBrk="1" latinLnBrk="0" hangingPunct="1">
+              <a:spcBef>
+                <a:spcPct val="20000"/>
+              </a:spcBef>
+              <a:buFont typeface="Arial"/>
+              <a:buChar char="•"/>
+              <a:defRPr sz="2000" kern="1200">
+                <a:solidFill>
+                  <a:schemeClr val="tx1"/>
+                </a:solidFill>
+                <a:latin typeface="+mn-lt"/>
+                <a:ea typeface="+mn-ea"/>
+                <a:cs typeface="+mn-cs"/>
+              </a:defRPr>
+            </a:lvl7pPr>
+            <a:lvl8pPr marL="3429000" indent="-228600" algn="l" defTabSz="457200" rtl="0" eaLnBrk="1" latinLnBrk="0" hangingPunct="1">
+              <a:spcBef>
+                <a:spcPct val="20000"/>
+              </a:spcBef>
+              <a:buFont typeface="Arial"/>
+              <a:buChar char="•"/>
+              <a:defRPr sz="2000" kern="1200">
+                <a:solidFill>
+                  <a:schemeClr val="tx1"/>
+                </a:solidFill>
+                <a:latin typeface="+mn-lt"/>
+                <a:ea typeface="+mn-ea"/>
+                <a:cs typeface="+mn-cs"/>
+              </a:defRPr>
+            </a:lvl8pPr>
+            <a:lvl9pPr marL="3886200" indent="-228600" algn="l" defTabSz="457200" rtl="0" eaLnBrk="1" latinLnBrk="0" hangingPunct="1">
+              <a:spcBef>
+                <a:spcPct val="20000"/>
+              </a:spcBef>
+              <a:buFont typeface="Arial"/>
+              <a:buChar char="•"/>
+              <a:defRPr sz="2000" kern="1200">
+                <a:solidFill>
+                  <a:schemeClr val="tx1"/>
+                </a:solidFill>
+                <a:latin typeface="+mn-lt"/>
+                <a:ea typeface="+mn-ea"/>
+                <a:cs typeface="+mn-cs"/>
+              </a:defRPr>
+            </a:lvl9pPr>
+          </a:lstStyle>
+          <a:p>
+            <a:pPr>
+              <a:lnSpc>
+                <a:spcPct val="105000"/>
+              </a:lnSpc>
+              <a:spcBef>
+                <a:spcPts val="600"/>
+              </a:spcBef>
+            </a:pPr>
+            <a:endParaRPr lang="en-US" sz="1800">
+              <a:solidFill>
+                <a:schemeClr val="bg2">
+                  <a:lumMod val="85000"/>
+                </a:schemeClr>
+              </a:solidFill>
+              <a:latin typeface="IBM Plex Sans" panose="020B0503050203000203" pitchFamily="34" charset="0"/>
+            </a:endParaRPr>
+          </a:p>
+        </p:txBody>
+      </p:sp>
+      <p:pic>
+        <p:nvPicPr>
+          <p:cNvPr id="4" name="Picture 3" descr="A picture containing laser&#10;&#10;Description automatically generated">
+            <a:extLst>
+              <a:ext uri="{FF2B5EF4-FFF2-40B4-BE49-F238E27FC236}">
+                <a16:creationId xmlns:a16="http://schemas.microsoft.com/office/drawing/2014/main" id="{1ED11CC1-5650-8D04-AC8A-CFE316ADFA34}"/>
+              </a:ext>
+            </a:extLst>
+          </p:cNvPr>
+          <p:cNvPicPr>
+            <a:picLocks noChangeAspect="1"/>
+          </p:cNvPicPr>
+          <p:nvPr userDrawn="1"/>
+        </p:nvPicPr>
+        <p:blipFill>
+          <a:blip r:embed="rId2" cstate="email">
+            <a:alphaModFix amt="26000"/>
+            <a:extLst>
+              <a:ext uri="{BEBA8EAE-BF5A-486C-A8C5-ECC9F3942E4B}">
+                <a14:imgProps xmlns:a14="http://schemas.microsoft.com/office/drawing/2010/main">
+                  <a14:imgLayer r:embed="rId3">
+                    <a14:imgEffect>
+                      <a14:saturation sat="65000"/>
+                    </a14:imgEffect>
+                    <a14:imgEffect>
+                      <a14:brightnessContrast bright="41000"/>
+                    </a14:imgEffect>
+                  </a14:imgLayer>
+                </a14:imgProps>
+              </a:ext>
+              <a:ext uri="{28A0092B-C50C-407E-A947-70E740481C1C}">
+                <a14:useLocalDpi xmlns:a14="http://schemas.microsoft.com/office/drawing/2010/main"/>
+              </a:ext>
+            </a:extLst>
+          </a:blip>
+          <a:stretch>
+            <a:fillRect/>
+          </a:stretch>
+        </p:blipFill>
+        <p:spPr>
+          <a:xfrm>
+            <a:off x="0" y="1371600"/>
+            <a:ext cx="14630400" cy="7153608"/>
+          </a:xfrm>
+          <a:prstGeom prst="rect">
+            <a:avLst/>
+          </a:prstGeom>
+          <a:solidFill>
+            <a:schemeClr val="tx2">
+              <a:lumMod val="75000"/>
+              <a:alpha val="54000"/>
+            </a:schemeClr>
+          </a:solidFill>
+        </p:spPr>
+      </p:pic>
+      <p:sp>
+        <p:nvSpPr>
+          <p:cNvPr id="6" name="Title 1">
+            <a:extLst>
+              <a:ext uri="{FF2B5EF4-FFF2-40B4-BE49-F238E27FC236}">
+                <a16:creationId xmlns:a16="http://schemas.microsoft.com/office/drawing/2014/main" id="{CC1B7A90-E555-4E24-3575-C58A0E372F61}"/>
+              </a:ext>
+            </a:extLst>
+          </p:cNvPr>
+          <p:cNvSpPr>
+            <a:spLocks noGrp="1"/>
+          </p:cNvSpPr>
+          <p:nvPr>
+            <p:ph type="title" hasCustomPrompt="1"/>
+          </p:nvPr>
+        </p:nvSpPr>
+        <p:spPr>
+          <a:xfrm>
+            <a:off x="38100" y="38100"/>
+            <a:ext cx="13716000" cy="685800"/>
+          </a:xfrm>
+        </p:spPr>
+        <p:txBody>
+          <a:bodyPr>
+            <a:noAutofit/>
+          </a:bodyPr>
+          <a:lstStyle>
+            <a:lvl1pPr>
+              <a:defRPr b="1">
+                <a:solidFill>
+                  <a:schemeClr val="bg2"/>
+                </a:solidFill>
+                <a:latin typeface="IBM Plex Sans" charset="0"/>
+                <a:ea typeface="IBM Plex Sans" charset="0"/>
+                <a:cs typeface="IBM Plex Sans" charset="0"/>
+              </a:defRPr>
+            </a:lvl1pPr>
+          </a:lstStyle>
+          <a:p>
+            <a:r>
+              <a:rPr lang="en-US" dirty="0"/>
+              <a:t>Fybrik Open </a:t>
+            </a:r>
+            <a:r>
+              <a:rPr lang="en-US" dirty="0" err="1"/>
+              <a:t>Architcture</a:t>
+            </a:r>
             <a:endParaRPr lang="en-US" dirty="0"/>
           </a:p>
         </p:txBody>
@@ -1287,7 +1616,7 @@
         </p:nvSpPr>
         <p:spPr>
           <a:xfrm>
-            <a:off x="162224" y="6770458"/>
+            <a:off x="162224" y="7058346"/>
             <a:ext cx="11121835" cy="963427"/>
           </a:xfrm>
           <a:prstGeom prst="rect">
@@ -1431,7 +1760,7 @@
         </p:nvSpPr>
         <p:spPr>
           <a:xfrm>
-            <a:off x="11833656" y="2551027"/>
+            <a:off x="11821550" y="1850088"/>
             <a:ext cx="2401425" cy="1551032"/>
           </a:xfrm>
           <a:prstGeom prst="rect">
@@ -1567,7 +1896,7 @@
         </p:nvSpPr>
         <p:spPr>
           <a:xfrm>
-            <a:off x="212417" y="2379421"/>
+            <a:off x="208257" y="3344609"/>
             <a:ext cx="0" cy="0"/>
           </a:xfrm>
           <a:prstGeom prst="rect">
@@ -1609,8 +1938,8 @@
         </p:nvSpPr>
         <p:spPr>
           <a:xfrm>
-            <a:off x="192516" y="2016110"/>
-            <a:ext cx="11121835" cy="4259057"/>
+            <a:off x="157175" y="3309926"/>
+            <a:ext cx="11121835" cy="3418375"/>
           </a:xfrm>
           <a:prstGeom prst="rect">
             <a:avLst/>
@@ -1726,19 +2055,7 @@
               <a:rPr lang="en-US" sz="2000" b="0" dirty="0">
                 <a:latin typeface="+mn-lt"/>
               </a:rPr>
-              <a:t>							       </a:t>
-            </a:r>
-            <a:r>
-              <a:rPr lang="en-US" sz="2000" b="0" dirty="0" err="1">
-                <a:latin typeface="+mn-lt"/>
-              </a:rPr>
-              <a:t>Fybrik</a:t>
-            </a:r>
-            <a:r>
-              <a:rPr lang="en-US" sz="2000" b="0" dirty="0">
-                <a:latin typeface="+mn-lt"/>
-              </a:rPr>
-              <a:t> control plane</a:t>
+              <a:t>							         Fybrik control plane</a:t>
             </a:r>
           </a:p>
         </p:txBody>
@@ -1757,8 +2074,8 @@
         </p:nvSpPr>
         <p:spPr>
           <a:xfrm>
-            <a:off x="2025692" y="3038048"/>
-            <a:ext cx="8610693" cy="2770881"/>
+            <a:off x="2048413" y="4113315"/>
+            <a:ext cx="8610693" cy="2443477"/>
           </a:xfrm>
           <a:prstGeom prst="rect">
             <a:avLst/>
@@ -1817,7 +2134,7 @@
         </p:nvSpPr>
         <p:spPr>
           <a:xfrm>
-            <a:off x="2499160" y="3717186"/>
+            <a:off x="2474402" y="4585540"/>
             <a:ext cx="7854132" cy="679531"/>
           </a:xfrm>
           <a:prstGeom prst="rect">
@@ -1872,7 +2189,7 @@
         </p:nvSpPr>
         <p:spPr>
           <a:xfrm>
-            <a:off x="4277404" y="4730753"/>
+            <a:off x="4252646" y="5599107"/>
             <a:ext cx="4107267" cy="679531"/>
           </a:xfrm>
           <a:prstGeom prst="rect">
@@ -1900,7 +2217,7 @@
                   <a:schemeClr val="bg2"/>
                 </a:solidFill>
               </a:rPr>
-              <a:t>Blueprint Controller</a:t>
+              <a:t>Plotter/Blueprint Controller</a:t>
             </a:r>
           </a:p>
         </p:txBody>
@@ -1919,7 +2236,7 @@
         </p:nvSpPr>
         <p:spPr>
           <a:xfrm>
-            <a:off x="629372" y="265489"/>
+            <a:off x="662438" y="1693334"/>
             <a:ext cx="2210862" cy="369332"/>
           </a:xfrm>
           <a:prstGeom prst="rect">
@@ -1955,7 +2272,7 @@
         </p:nvSpPr>
         <p:spPr>
           <a:xfrm>
-            <a:off x="3841295" y="265489"/>
+            <a:off x="3876641" y="1701689"/>
             <a:ext cx="1531189" cy="369332"/>
           </a:xfrm>
           <a:prstGeom prst="rect">
@@ -1991,7 +2308,7 @@
         </p:nvSpPr>
         <p:spPr>
           <a:xfrm>
-            <a:off x="192516" y="831198"/>
+            <a:off x="227710" y="2100708"/>
             <a:ext cx="3109513" cy="1009215"/>
           </a:xfrm>
           <a:prstGeom prst="rect">
@@ -2037,10 +2354,10 @@
         </p:nvGrpSpPr>
         <p:grpSpPr>
           <a:xfrm>
-            <a:off x="10377447" y="3058874"/>
-            <a:ext cx="3669805" cy="954969"/>
-            <a:chOff x="-1458903" y="1524277"/>
-            <a:chExt cx="3743767" cy="937534"/>
+            <a:off x="10348888" y="2333804"/>
+            <a:ext cx="3698364" cy="2425701"/>
+            <a:chOff x="-1488038" y="1524277"/>
+            <a:chExt cx="3772902" cy="2381415"/>
           </a:xfrm>
         </p:grpSpPr>
         <p:sp>
@@ -2258,8 +2575,8 @@
           </p:nvCxnSpPr>
           <p:spPr>
             <a:xfrm flipH="1">
-              <a:off x="-1458903" y="2175924"/>
-              <a:ext cx="2058966" cy="270305"/>
+              <a:off x="-1488038" y="2175925"/>
+              <a:ext cx="2088101" cy="1729767"/>
             </a:xfrm>
             <a:prstGeom prst="straightConnector1">
               <a:avLst/>
@@ -2336,7 +2653,7 @@
         </p:nvSpPr>
         <p:spPr>
           <a:xfrm>
-            <a:off x="5321122" y="6127303"/>
+            <a:off x="5156820" y="6547027"/>
             <a:ext cx="2237726" cy="466238"/>
           </a:xfrm>
           <a:prstGeom prst="downArrow">
@@ -2385,7 +2702,7 @@
         </p:nvSpPr>
         <p:spPr>
           <a:xfrm>
-            <a:off x="3459335" y="836218"/>
+            <a:off x="3494529" y="2105728"/>
             <a:ext cx="2415878" cy="1009215"/>
           </a:xfrm>
           <a:prstGeom prst="rect">
@@ -2431,8 +2748,8 @@
         </p:nvSpPr>
         <p:spPr>
           <a:xfrm>
-            <a:off x="6163176" y="836216"/>
-            <a:ext cx="2713924" cy="1005345"/>
+            <a:off x="6198370" y="2105726"/>
+            <a:ext cx="2713924" cy="1026423"/>
           </a:xfrm>
           <a:prstGeom prst="rect">
             <a:avLst/>
@@ -2474,13 +2791,14 @@
           </p:cNvPr>
           <p:cNvCxnSpPr>
             <a:cxnSpLocks/>
+            <a:stCxn id="61" idx="2"/>
           </p:cNvCxnSpPr>
           <p:nvPr/>
         </p:nvCxnSpPr>
         <p:spPr>
           <a:xfrm>
-            <a:off x="7484889" y="1841561"/>
-            <a:ext cx="0" cy="1875625"/>
+            <a:off x="7555332" y="3132149"/>
+            <a:ext cx="0" cy="1360850"/>
           </a:xfrm>
           <a:prstGeom prst="straightConnector1">
             <a:avLst/>
@@ -2521,7 +2839,7 @@
         </p:nvSpPr>
         <p:spPr>
           <a:xfrm>
-            <a:off x="6426226" y="2253310"/>
+            <a:off x="6422066" y="3449936"/>
             <a:ext cx="2117327" cy="491870"/>
           </a:xfrm>
           <a:prstGeom prst="hexagon">
@@ -2590,8 +2908,8 @@
         </p:nvCxnSpPr>
         <p:spPr>
           <a:xfrm>
-            <a:off x="4667274" y="1845433"/>
-            <a:ext cx="0" cy="1871753"/>
+            <a:off x="4702468" y="3114943"/>
+            <a:ext cx="0" cy="1432032"/>
           </a:xfrm>
           <a:prstGeom prst="straightConnector1">
             <a:avLst/>
@@ -2632,7 +2950,7 @@
         </p:nvSpPr>
         <p:spPr>
           <a:xfrm>
-            <a:off x="3646838" y="2236159"/>
+            <a:off x="3642678" y="3412491"/>
             <a:ext cx="2117327" cy="526174"/>
           </a:xfrm>
           <a:prstGeom prst="hexagon">
@@ -2700,9 +3018,9 @@
           <p:nvPr/>
         </p:nvCxnSpPr>
         <p:spPr>
-          <a:xfrm flipH="1">
-            <a:off x="1746222" y="1840413"/>
-            <a:ext cx="1051" cy="4855602"/>
+          <a:xfrm>
+            <a:off x="1782467" y="3109923"/>
+            <a:ext cx="0" cy="3903342"/>
           </a:xfrm>
           <a:prstGeom prst="straightConnector1">
             <a:avLst/>
@@ -2743,7 +3061,7 @@
         </p:nvSpPr>
         <p:spPr>
           <a:xfrm>
-            <a:off x="688608" y="2253559"/>
+            <a:off x="675379" y="3435417"/>
             <a:ext cx="2117327" cy="491371"/>
           </a:xfrm>
           <a:prstGeom prst="hexagon">
@@ -2809,7 +3127,7 @@
         </p:nvSpPr>
         <p:spPr>
           <a:xfrm>
-            <a:off x="8630718" y="3787192"/>
+            <a:off x="8605960" y="4655546"/>
             <a:ext cx="1554573" cy="518330"/>
           </a:xfrm>
           <a:prstGeom prst="rect">
@@ -2856,10 +3174,10 @@
         </p:nvGrpSpPr>
         <p:grpSpPr>
           <a:xfrm>
-            <a:off x="10377448" y="4119312"/>
-            <a:ext cx="3932329" cy="1105739"/>
-            <a:chOff x="-1319596" y="1592644"/>
-            <a:chExt cx="3918540" cy="1085551"/>
+            <a:off x="10328534" y="3842085"/>
+            <a:ext cx="3969139" cy="1083221"/>
+            <a:chOff x="-1356276" y="1975936"/>
+            <a:chExt cx="3955220" cy="1063444"/>
           </a:xfrm>
         </p:grpSpPr>
         <p:sp>
@@ -2951,13 +3269,14 @@
             <p:cNvCxnSpPr>
               <a:cxnSpLocks/>
               <a:stCxn id="74" idx="3"/>
+              <a:endCxn id="8" idx="3"/>
             </p:cNvCxnSpPr>
             <p:nvPr/>
           </p:nvCxnSpPr>
           <p:spPr>
-            <a:xfrm flipH="1" flipV="1">
-              <a:off x="-1319596" y="1592644"/>
-              <a:ext cx="1451103" cy="734422"/>
+            <a:xfrm flipH="1">
+              <a:off x="-1356276" y="2327066"/>
+              <a:ext cx="1487782" cy="712314"/>
             </a:xfrm>
             <a:prstGeom prst="straightConnector1">
               <a:avLst/>
@@ -2999,7 +3318,7 @@
         </p:nvSpPr>
         <p:spPr>
           <a:xfrm>
-            <a:off x="1392528" y="1082173"/>
+            <a:off x="1427722" y="2351683"/>
             <a:ext cx="1361286" cy="197118"/>
           </a:xfrm>
           <a:prstGeom prst="rect">
@@ -3062,7 +3381,7 @@
         </p:nvSpPr>
         <p:spPr>
           <a:xfrm>
-            <a:off x="800676" y="1064458"/>
+            <a:off x="835870" y="2333968"/>
             <a:ext cx="690191" cy="232547"/>
           </a:xfrm>
           <a:prstGeom prst="rect">
@@ -3117,7 +3436,7 @@
         </p:nvCxnSpPr>
         <p:spPr>
           <a:xfrm>
-            <a:off x="192516" y="1454620"/>
+            <a:off x="227710" y="2724130"/>
             <a:ext cx="3109513" cy="0"/>
           </a:xfrm>
           <a:prstGeom prst="line">
@@ -3160,7 +3479,7 @@
         </p:nvCxnSpPr>
         <p:spPr>
           <a:xfrm flipV="1">
-            <a:off x="868223" y="829536"/>
+            <a:off x="903417" y="2099046"/>
             <a:ext cx="0" cy="625083"/>
           </a:xfrm>
           <a:prstGeom prst="line">
@@ -3203,7 +3522,7 @@
         </p:nvCxnSpPr>
         <p:spPr>
           <a:xfrm flipV="1">
-            <a:off x="1387612" y="861218"/>
+            <a:off x="1422806" y="2130728"/>
             <a:ext cx="0" cy="593402"/>
           </a:xfrm>
           <a:prstGeom prst="line">
@@ -3244,7 +3563,7 @@
         </p:nvSpPr>
         <p:spPr>
           <a:xfrm>
-            <a:off x="136577" y="954430"/>
+            <a:off x="171771" y="2223940"/>
             <a:ext cx="748344" cy="452604"/>
           </a:xfrm>
           <a:prstGeom prst="rect">
@@ -3316,7 +3635,7 @@
         </p:nvSpPr>
         <p:spPr>
           <a:xfrm>
-            <a:off x="3138605" y="6975249"/>
+            <a:off x="3138605" y="7263137"/>
             <a:ext cx="5021178" cy="584498"/>
           </a:xfrm>
           <a:prstGeom prst="rect">
@@ -3465,7 +3784,7 @@
         </p:blipFill>
         <p:spPr>
           <a:xfrm>
-            <a:off x="4358228" y="7142971"/>
+            <a:off x="4358228" y="7430859"/>
             <a:ext cx="568016" cy="326097"/>
           </a:xfrm>
           <a:prstGeom prst="rect">
@@ -3501,7 +3820,7 @@
         </p:blipFill>
         <p:spPr>
           <a:xfrm>
-            <a:off x="5834353" y="7041114"/>
+            <a:off x="5834353" y="7329002"/>
             <a:ext cx="441330" cy="512985"/>
           </a:xfrm>
           <a:prstGeom prst="rect">
@@ -3537,7 +3856,7 @@
         </p:blipFill>
         <p:spPr>
           <a:xfrm>
-            <a:off x="7425736" y="6975249"/>
+            <a:off x="7425736" y="7263137"/>
             <a:ext cx="550570" cy="639958"/>
           </a:xfrm>
           <a:prstGeom prst="rect">
@@ -3559,7 +3878,7 @@
         </p:nvSpPr>
         <p:spPr>
           <a:xfrm>
-            <a:off x="3022279" y="917965"/>
+            <a:off x="3057473" y="2287229"/>
             <a:ext cx="2359891" cy="343638"/>
           </a:xfrm>
           <a:prstGeom prst="rect">
@@ -3622,7 +3941,7 @@
         </p:nvSpPr>
         <p:spPr>
           <a:xfrm>
-            <a:off x="3482051" y="1323846"/>
+            <a:off x="4475800" y="2771305"/>
             <a:ext cx="2359891" cy="343638"/>
           </a:xfrm>
           <a:prstGeom prst="rect">
@@ -3635,30 +3954,41 @@
           </a:bodyPr>
           <a:lstStyle/>
           <a:p>
-            <a:pPr algn="ctr"/>
+            <a:pPr>
+              <a:lnSpc>
+                <a:spcPct val="105000"/>
+              </a:lnSpc>
+              <a:spcBef>
+                <a:spcPts val="1000"/>
+              </a:spcBef>
+            </a:pPr>
+            <a:r>
+              <a:rPr lang="en-IL" sz="1600" dirty="0">
+                <a:solidFill>
+                  <a:schemeClr val="bg2"/>
+                </a:solidFill>
+                <a:ea typeface="IBM Plex Sans" charset="0"/>
+                <a:cs typeface="IBM Plex Sans" charset="0"/>
+              </a:rPr>
+              <a:t>WKC</a:t>
+            </a:r>
             <a:r>
               <a:rPr lang="en-US" sz="1600" dirty="0">
                 <a:solidFill>
                   <a:schemeClr val="bg2"/>
                 </a:solidFill>
+                <a:ea typeface="IBM Plex Sans" charset="0"/>
+                <a:cs typeface="IBM Plex Sans" charset="0"/>
               </a:rPr>
-              <a:t>Watson</a:t>
+              <a:t>*</a:t>
             </a:r>
-            <a:br>
-              <a:rPr lang="en-US" sz="1600" dirty="0">
-                <a:solidFill>
-                  <a:schemeClr val="bg2"/>
-                </a:solidFill>
-              </a:rPr>
-            </a:br>
-            <a:r>
-              <a:rPr lang="en-US" sz="1600" dirty="0">
-                <a:solidFill>
-                  <a:schemeClr val="bg2"/>
-                </a:solidFill>
-              </a:rPr>
-              <a:t>Knowledge Catalog</a:t>
-            </a:r>
+            <a:endParaRPr lang="en-IL" sz="1600" dirty="0">
+              <a:solidFill>
+                <a:schemeClr val="bg2"/>
+              </a:solidFill>
+              <a:ea typeface="IBM Plex Sans" charset="0"/>
+              <a:cs typeface="IBM Plex Sans" charset="0"/>
+            </a:endParaRPr>
           </a:p>
         </p:txBody>
       </p:sp>
@@ -3676,7 +4006,7 @@
         </p:nvSpPr>
         <p:spPr>
           <a:xfrm>
-            <a:off x="4207396" y="933694"/>
+            <a:off x="4242590" y="2292257"/>
             <a:ext cx="2359891" cy="343638"/>
           </a:xfrm>
           <a:prstGeom prst="rect">
@@ -3731,8 +4061,8 @@
         </p:nvCxnSpPr>
         <p:spPr>
           <a:xfrm flipV="1">
-            <a:off x="4951281" y="829536"/>
-            <a:ext cx="0" cy="470962"/>
+            <a:off x="5043796" y="2099046"/>
+            <a:ext cx="0" cy="617132"/>
           </a:xfrm>
           <a:prstGeom prst="line">
             <a:avLst/>
@@ -3774,7 +4104,7 @@
         </p:nvCxnSpPr>
         <p:spPr>
           <a:xfrm>
-            <a:off x="3459335" y="1292310"/>
+            <a:off x="3494529" y="2719756"/>
             <a:ext cx="2415878" cy="0"/>
           </a:xfrm>
           <a:prstGeom prst="line">
@@ -3817,7 +4147,7 @@
         </p:nvCxnSpPr>
         <p:spPr>
           <a:xfrm>
-            <a:off x="6163176" y="1290373"/>
+            <a:off x="6218081" y="2719756"/>
             <a:ext cx="2713924" cy="0"/>
           </a:xfrm>
           <a:prstGeom prst="line">
@@ -3858,7 +4188,7 @@
         </p:nvSpPr>
         <p:spPr>
           <a:xfrm>
-            <a:off x="6270827" y="1329699"/>
+            <a:off x="7313422" y="2788511"/>
             <a:ext cx="2359891" cy="343638"/>
           </a:xfrm>
           <a:prstGeom prst="rect">
@@ -3871,30 +4201,41 @@
           </a:bodyPr>
           <a:lstStyle/>
           <a:p>
-            <a:pPr algn="ctr"/>
+            <a:pPr>
+              <a:lnSpc>
+                <a:spcPct val="105000"/>
+              </a:lnSpc>
+              <a:spcBef>
+                <a:spcPts val="1000"/>
+              </a:spcBef>
+            </a:pPr>
+            <a:r>
+              <a:rPr lang="en-IL" sz="1600" dirty="0">
+                <a:solidFill>
+                  <a:schemeClr val="bg2"/>
+                </a:solidFill>
+                <a:ea typeface="IBM Plex Sans" charset="0"/>
+                <a:cs typeface="IBM Plex Sans" charset="0"/>
+              </a:rPr>
+              <a:t>WKC</a:t>
+            </a:r>
             <a:r>
               <a:rPr lang="en-US" sz="1600" dirty="0">
                 <a:solidFill>
                   <a:schemeClr val="bg2"/>
                 </a:solidFill>
+                <a:ea typeface="IBM Plex Sans" charset="0"/>
+                <a:cs typeface="IBM Plex Sans" charset="0"/>
               </a:rPr>
-              <a:t>Watson</a:t>
+              <a:t>*</a:t>
             </a:r>
-            <a:br>
-              <a:rPr lang="en-US" sz="1600" dirty="0">
-                <a:solidFill>
-                  <a:schemeClr val="bg2"/>
-                </a:solidFill>
-              </a:rPr>
-            </a:br>
-            <a:r>
-              <a:rPr lang="en-US" sz="1600" dirty="0">
-                <a:solidFill>
-                  <a:schemeClr val="bg2"/>
-                </a:solidFill>
-              </a:rPr>
-              <a:t>Knowledge Catalog</a:t>
-            </a:r>
+            <a:endParaRPr lang="en-IL" sz="1600" dirty="0">
+              <a:solidFill>
+                <a:schemeClr val="bg2"/>
+              </a:solidFill>
+              <a:ea typeface="IBM Plex Sans" charset="0"/>
+              <a:cs typeface="IBM Plex Sans" charset="0"/>
+            </a:endParaRPr>
           </a:p>
         </p:txBody>
       </p:sp>
@@ -3912,7 +4253,7 @@
         </p:nvSpPr>
         <p:spPr>
           <a:xfrm>
-            <a:off x="6359904" y="924558"/>
+            <a:off x="6395098" y="2293473"/>
             <a:ext cx="2359891" cy="343638"/>
           </a:xfrm>
           <a:prstGeom prst="rect">
@@ -3963,7 +4304,7 @@
         </p:nvSpPr>
         <p:spPr>
           <a:xfrm>
-            <a:off x="868223" y="1533585"/>
+            <a:off x="903417" y="2803095"/>
             <a:ext cx="1791652" cy="274986"/>
           </a:xfrm>
           <a:prstGeom prst="rect">
@@ -4013,7 +4354,7 @@
         </p:nvCxnSpPr>
         <p:spPr>
           <a:xfrm flipV="1">
-            <a:off x="2737942" y="861218"/>
+            <a:off x="2773136" y="2130728"/>
             <a:ext cx="0" cy="593402"/>
           </a:xfrm>
           <a:prstGeom prst="line">
@@ -4054,8 +4395,8 @@
         </p:nvSpPr>
         <p:spPr>
           <a:xfrm>
-            <a:off x="2815182" y="1081584"/>
-            <a:ext cx="439795" cy="198295"/>
+            <a:off x="2820307" y="2351094"/>
+            <a:ext cx="494318" cy="255555"/>
           </a:xfrm>
           <a:prstGeom prst="rect">
             <a:avLst/>
@@ -4085,6 +4426,23 @@
               </a:rPr>
               <a:t>WKC</a:t>
             </a:r>
+            <a:r>
+              <a:rPr lang="en-US" sz="1400" dirty="0">
+                <a:solidFill>
+                  <a:schemeClr val="bg2"/>
+                </a:solidFill>
+                <a:ea typeface="IBM Plex Sans" charset="0"/>
+                <a:cs typeface="IBM Plex Sans" charset="0"/>
+              </a:rPr>
+              <a:t>*</a:t>
+            </a:r>
+            <a:endParaRPr lang="en-IL" sz="1400" dirty="0">
+              <a:solidFill>
+                <a:schemeClr val="bg2"/>
+              </a:solidFill>
+              <a:ea typeface="IBM Plex Sans" charset="0"/>
+              <a:cs typeface="IBM Plex Sans" charset="0"/>
+            </a:endParaRPr>
           </a:p>
         </p:txBody>
       </p:sp>
@@ -4102,8 +4460,8 @@
         </p:nvSpPr>
         <p:spPr>
           <a:xfrm>
-            <a:off x="6297030" y="113089"/>
-            <a:ext cx="2446217" cy="646331"/>
+            <a:off x="5671800" y="1698316"/>
+            <a:ext cx="3724580" cy="369332"/>
           </a:xfrm>
           <a:prstGeom prst="rect">
             <a:avLst/>
@@ -4119,18 +4477,1346 @@
             <a:pPr algn="ctr"/>
             <a:r>
               <a:rPr lang="en-US" sz="1800" dirty="0"/>
-              <a:t>Data Governance</a:t>
-            </a:r>
-          </a:p>
-          <a:p>
-            <a:pPr algn="ctr"/>
-            <a:r>
-              <a:rPr lang="en-US" sz="1800" dirty="0"/>
-              <a:t>Policy Manager</a:t>
+              <a:t>Data Governance Policy Manager</a:t>
             </a:r>
           </a:p>
         </p:txBody>
       </p:sp>
+      <p:grpSp>
+        <p:nvGrpSpPr>
+          <p:cNvPr id="4" name="Group 3">
+            <a:extLst>
+              <a:ext uri="{FF2B5EF4-FFF2-40B4-BE49-F238E27FC236}">
+                <a16:creationId xmlns:a16="http://schemas.microsoft.com/office/drawing/2014/main" id="{4137B913-B91D-43C6-5AF5-98D733037189}"/>
+              </a:ext>
+            </a:extLst>
+          </p:cNvPr>
+          <p:cNvGrpSpPr>
+            <a:grpSpLocks noChangeAspect="1"/>
+          </p:cNvGrpSpPr>
+          <p:nvPr/>
+        </p:nvGrpSpPr>
+        <p:grpSpPr>
+          <a:xfrm>
+            <a:off x="9606501" y="713843"/>
+            <a:ext cx="1127670" cy="964794"/>
+            <a:chOff x="4526990" y="686270"/>
+            <a:chExt cx="1652265" cy="1413619"/>
+          </a:xfrm>
+        </p:grpSpPr>
+        <p:pic>
+          <p:nvPicPr>
+            <p:cNvPr id="9" name="Picture 8">
+              <a:extLst>
+                <a:ext uri="{FF2B5EF4-FFF2-40B4-BE49-F238E27FC236}">
+                  <a16:creationId xmlns:a16="http://schemas.microsoft.com/office/drawing/2014/main" id="{D9C97847-50E8-B123-BBA2-B365FE085B74}"/>
+                </a:ext>
+              </a:extLst>
+            </p:cNvPr>
+            <p:cNvPicPr>
+              <a:picLocks noChangeAspect="1"/>
+            </p:cNvPicPr>
+            <p:nvPr/>
+          </p:nvPicPr>
+          <p:blipFill>
+            <a:blip r:embed="rId9"/>
+            <a:stretch>
+              <a:fillRect/>
+            </a:stretch>
+          </p:blipFill>
+          <p:spPr>
+            <a:xfrm>
+              <a:off x="4892882" y="686270"/>
+              <a:ext cx="920483" cy="920483"/>
+            </a:xfrm>
+            <a:prstGeom prst="rect">
+              <a:avLst/>
+            </a:prstGeom>
+          </p:spPr>
+        </p:pic>
+        <p:sp>
+          <p:nvSpPr>
+            <p:cNvPr id="10" name="Rectangle 9">
+              <a:extLst>
+                <a:ext uri="{FF2B5EF4-FFF2-40B4-BE49-F238E27FC236}">
+                  <a16:creationId xmlns:a16="http://schemas.microsoft.com/office/drawing/2014/main" id="{70959D83-B643-FBF7-B722-D565E778A851}"/>
+                </a:ext>
+              </a:extLst>
+            </p:cNvPr>
+            <p:cNvSpPr/>
+            <p:nvPr/>
+          </p:nvSpPr>
+          <p:spPr>
+            <a:xfrm>
+              <a:off x="4526990" y="1648933"/>
+              <a:ext cx="1652265" cy="450956"/>
+            </a:xfrm>
+            <a:prstGeom prst="rect">
+              <a:avLst/>
+            </a:prstGeom>
+          </p:spPr>
+          <p:txBody>
+            <a:bodyPr wrap="square">
+              <a:spAutoFit/>
+            </a:bodyPr>
+            <a:lstStyle/>
+            <a:p>
+              <a:pPr marL="0" marR="0" lvl="0" indent="0" algn="ctr" defTabSz="489307" rtl="0" eaLnBrk="0" fontAlgn="base" latinLnBrk="0" hangingPunct="0">
+                <a:lnSpc>
+                  <a:spcPct val="100000"/>
+                </a:lnSpc>
+                <a:spcBef>
+                  <a:spcPct val="0"/>
+                </a:spcBef>
+                <a:spcAft>
+                  <a:spcPct val="0"/>
+                </a:spcAft>
+                <a:buClrTx/>
+                <a:buSzTx/>
+                <a:buFontTx/>
+                <a:buNone/>
+                <a:tabLst/>
+                <a:defRPr/>
+              </a:pPr>
+              <a:r>
+                <a:rPr kumimoji="0" lang="en-US" altLang="zh-CN" sz="1400" i="0" u="none" strike="noStrike" kern="1200" cap="none" spc="0" normalizeH="0" baseline="0" noProof="0" dirty="0">
+                  <a:ln>
+                    <a:noFill/>
+                  </a:ln>
+                  <a:solidFill>
+                    <a:prstClr val="black"/>
+                  </a:solidFill>
+                  <a:effectLst/>
+                  <a:uLnTx/>
+                  <a:uFillTx/>
+                  <a:ea typeface="DengXian" panose="02010600030101010101" pitchFamily="2" charset="-122"/>
+                  <a:cs typeface="IBM Plex Arabic" panose="020B0503050203000203" pitchFamily="34" charset="-78"/>
+                </a:rPr>
+                <a:t>Data User</a:t>
+              </a:r>
+            </a:p>
+          </p:txBody>
+        </p:sp>
+      </p:grpSp>
+      <p:grpSp>
+        <p:nvGrpSpPr>
+          <p:cNvPr id="11" name="Group 10">
+            <a:extLst>
+              <a:ext uri="{FF2B5EF4-FFF2-40B4-BE49-F238E27FC236}">
+                <a16:creationId xmlns:a16="http://schemas.microsoft.com/office/drawing/2014/main" id="{E90057DF-3BBE-7CDE-4D2C-E02825630F81}"/>
+              </a:ext>
+            </a:extLst>
+          </p:cNvPr>
+          <p:cNvGrpSpPr>
+            <a:grpSpLocks noChangeAspect="1"/>
+          </p:cNvGrpSpPr>
+          <p:nvPr/>
+        </p:nvGrpSpPr>
+        <p:grpSpPr>
+          <a:xfrm>
+            <a:off x="5774710" y="694297"/>
+            <a:ext cx="3395530" cy="1146303"/>
+            <a:chOff x="2958119" y="2695596"/>
+            <a:chExt cx="4975137" cy="1679563"/>
+          </a:xfrm>
+        </p:grpSpPr>
+        <p:pic>
+          <p:nvPicPr>
+            <p:cNvPr id="12" name="Picture 11">
+              <a:extLst>
+                <a:ext uri="{FF2B5EF4-FFF2-40B4-BE49-F238E27FC236}">
+                  <a16:creationId xmlns:a16="http://schemas.microsoft.com/office/drawing/2014/main" id="{5BEFC1A9-29AD-8759-2658-3CA38A71DCB9}"/>
+                </a:ext>
+              </a:extLst>
+            </p:cNvPr>
+            <p:cNvPicPr>
+              <a:picLocks noChangeAspect="1"/>
+            </p:cNvPicPr>
+            <p:nvPr/>
+          </p:nvPicPr>
+          <p:blipFill>
+            <a:blip r:embed="rId10"/>
+            <a:stretch>
+              <a:fillRect/>
+            </a:stretch>
+          </p:blipFill>
+          <p:spPr>
+            <a:xfrm>
+              <a:off x="4895095" y="2695596"/>
+              <a:ext cx="916056" cy="903150"/>
+            </a:xfrm>
+            <a:prstGeom prst="rect">
+              <a:avLst/>
+            </a:prstGeom>
+          </p:spPr>
+        </p:pic>
+        <p:sp>
+          <p:nvSpPr>
+            <p:cNvPr id="13" name="Rectangle 12">
+              <a:extLst>
+                <a:ext uri="{FF2B5EF4-FFF2-40B4-BE49-F238E27FC236}">
+                  <a16:creationId xmlns:a16="http://schemas.microsoft.com/office/drawing/2014/main" id="{A05354B5-D005-872B-837F-6DBAAE489578}"/>
+                </a:ext>
+              </a:extLst>
+            </p:cNvPr>
+            <p:cNvSpPr/>
+            <p:nvPr/>
+          </p:nvSpPr>
+          <p:spPr>
+            <a:xfrm>
+              <a:off x="2958119" y="3608537"/>
+              <a:ext cx="4975137" cy="766622"/>
+            </a:xfrm>
+            <a:prstGeom prst="rect">
+              <a:avLst/>
+            </a:prstGeom>
+          </p:spPr>
+          <p:txBody>
+            <a:bodyPr wrap="square">
+              <a:spAutoFit/>
+            </a:bodyPr>
+            <a:lstStyle/>
+            <a:p>
+              <a:pPr marL="0" marR="0" lvl="0" indent="0" algn="ctr" defTabSz="489307" rtl="0" eaLnBrk="0" fontAlgn="base" latinLnBrk="0" hangingPunct="0">
+                <a:lnSpc>
+                  <a:spcPct val="100000"/>
+                </a:lnSpc>
+                <a:spcBef>
+                  <a:spcPct val="0"/>
+                </a:spcBef>
+                <a:spcAft>
+                  <a:spcPct val="0"/>
+                </a:spcAft>
+                <a:buClrTx/>
+                <a:buSzTx/>
+                <a:buFontTx/>
+                <a:buNone/>
+                <a:tabLst/>
+                <a:defRPr/>
+              </a:pPr>
+              <a:r>
+                <a:rPr kumimoji="0" lang="en-US" altLang="zh-CN" sz="1400" i="0" u="none" strike="noStrike" kern="1200" cap="none" spc="0" normalizeH="0" baseline="0" noProof="0" dirty="0">
+                  <a:ln>
+                    <a:noFill/>
+                  </a:ln>
+                  <a:solidFill>
+                    <a:prstClr val="black"/>
+                  </a:solidFill>
+                  <a:effectLst/>
+                  <a:uLnTx/>
+                  <a:uFillTx/>
+                  <a:ea typeface="DengXian" panose="02010600030101010101" pitchFamily="2" charset="-122"/>
+                  <a:cs typeface="IBM Plex Arabic" panose="020B0503050203000203" pitchFamily="34" charset="-78"/>
+                </a:rPr>
+                <a:t>Governance</a:t>
+              </a:r>
+              <a:br>
+                <a:rPr lang="en-US" altLang="zh-CN" sz="1400" dirty="0">
+                  <a:solidFill>
+                    <a:prstClr val="black"/>
+                  </a:solidFill>
+                  <a:ea typeface="DengXian" panose="02010600030101010101" pitchFamily="2" charset="-122"/>
+                  <a:cs typeface="IBM Plex Arabic" panose="020B0503050203000203" pitchFamily="34" charset="-78"/>
+                </a:rPr>
+              </a:br>
+              <a:r>
+                <a:rPr kumimoji="0" lang="en-US" altLang="zh-CN" sz="1400" i="0" u="none" strike="noStrike" kern="1200" cap="none" spc="0" normalizeH="0" baseline="0" noProof="0" dirty="0">
+                  <a:ln>
+                    <a:noFill/>
+                  </a:ln>
+                  <a:solidFill>
+                    <a:prstClr val="black"/>
+                  </a:solidFill>
+                  <a:effectLst/>
+                  <a:uLnTx/>
+                  <a:uFillTx/>
+                  <a:ea typeface="DengXian" panose="02010600030101010101" pitchFamily="2" charset="-122"/>
+                  <a:cs typeface="IBM Plex Arabic" panose="020B0503050203000203" pitchFamily="34" charset="-78"/>
+                </a:rPr>
+                <a:t>Officer </a:t>
+              </a:r>
+            </a:p>
+          </p:txBody>
+        </p:sp>
+      </p:grpSp>
+      <p:grpSp>
+        <p:nvGrpSpPr>
+          <p:cNvPr id="14" name="Group 13">
+            <a:extLst>
+              <a:ext uri="{FF2B5EF4-FFF2-40B4-BE49-F238E27FC236}">
+                <a16:creationId xmlns:a16="http://schemas.microsoft.com/office/drawing/2014/main" id="{E42B7F79-0DED-3F8F-5B83-636E02CF0277}"/>
+              </a:ext>
+            </a:extLst>
+          </p:cNvPr>
+          <p:cNvGrpSpPr>
+            <a:grpSpLocks noChangeAspect="1"/>
+          </p:cNvGrpSpPr>
+          <p:nvPr/>
+        </p:nvGrpSpPr>
+        <p:grpSpPr>
+          <a:xfrm>
+            <a:off x="12576350" y="709293"/>
+            <a:ext cx="891827" cy="990894"/>
+            <a:chOff x="4699770" y="5202565"/>
+            <a:chExt cx="1306704" cy="1451860"/>
+          </a:xfrm>
+        </p:grpSpPr>
+        <p:pic>
+          <p:nvPicPr>
+            <p:cNvPr id="15" name="Picture 14">
+              <a:extLst>
+                <a:ext uri="{FF2B5EF4-FFF2-40B4-BE49-F238E27FC236}">
+                  <a16:creationId xmlns:a16="http://schemas.microsoft.com/office/drawing/2014/main" id="{9510C6BE-3107-D639-80FE-AF524C1B493F}"/>
+                </a:ext>
+              </a:extLst>
+            </p:cNvPr>
+            <p:cNvPicPr>
+              <a:picLocks noChangeAspect="1"/>
+            </p:cNvPicPr>
+            <p:nvPr/>
+          </p:nvPicPr>
+          <p:blipFill>
+            <a:blip r:embed="rId11"/>
+            <a:stretch>
+              <a:fillRect/>
+            </a:stretch>
+          </p:blipFill>
+          <p:spPr>
+            <a:xfrm>
+              <a:off x="4895095" y="5202565"/>
+              <a:ext cx="916056" cy="916056"/>
+            </a:xfrm>
+            <a:prstGeom prst="rect">
+              <a:avLst/>
+            </a:prstGeom>
+          </p:spPr>
+        </p:pic>
+        <p:sp>
+          <p:nvSpPr>
+            <p:cNvPr id="16" name="Rectangle 15">
+              <a:extLst>
+                <a:ext uri="{FF2B5EF4-FFF2-40B4-BE49-F238E27FC236}">
+                  <a16:creationId xmlns:a16="http://schemas.microsoft.com/office/drawing/2014/main" id="{BD3AFC5D-A438-EA39-A85B-FAC1EF06A791}"/>
+                </a:ext>
+              </a:extLst>
+            </p:cNvPr>
+            <p:cNvSpPr/>
+            <p:nvPr/>
+          </p:nvSpPr>
+          <p:spPr>
+            <a:xfrm>
+              <a:off x="4699770" y="6188023"/>
+              <a:ext cx="1306704" cy="466402"/>
+            </a:xfrm>
+            <a:prstGeom prst="rect">
+              <a:avLst/>
+            </a:prstGeom>
+          </p:spPr>
+          <p:txBody>
+            <a:bodyPr wrap="square" lIns="0" tIns="56160" rIns="0">
+              <a:spAutoFit/>
+            </a:bodyPr>
+            <a:lstStyle/>
+            <a:p>
+              <a:pPr marL="0" marR="0" lvl="0" indent="0" algn="ctr" defTabSz="489307" rtl="0" eaLnBrk="0" fontAlgn="base" latinLnBrk="0" hangingPunct="0">
+                <a:lnSpc>
+                  <a:spcPct val="100000"/>
+                </a:lnSpc>
+                <a:spcBef>
+                  <a:spcPct val="0"/>
+                </a:spcBef>
+                <a:spcAft>
+                  <a:spcPct val="0"/>
+                </a:spcAft>
+                <a:buClrTx/>
+                <a:buSzTx/>
+                <a:buFontTx/>
+                <a:buNone/>
+                <a:tabLst/>
+                <a:defRPr/>
+              </a:pPr>
+              <a:r>
+                <a:rPr kumimoji="0" lang="en-US" altLang="zh-CN" sz="1400" i="0" u="none" strike="noStrike" kern="1200" cap="none" spc="0" normalizeH="0" baseline="0" noProof="0" dirty="0">
+                  <a:ln>
+                    <a:noFill/>
+                  </a:ln>
+                  <a:solidFill>
+                    <a:prstClr val="black"/>
+                  </a:solidFill>
+                  <a:effectLst/>
+                  <a:uLnTx/>
+                  <a:uFillTx/>
+                  <a:ea typeface="DengXian" panose="02010600030101010101" pitchFamily="2" charset="-122"/>
+                  <a:cs typeface="IBM Plex Arabic" panose="020B0503050203000203" pitchFamily="34" charset="-78"/>
+                </a:rPr>
+                <a:t>IT Admin</a:t>
+              </a:r>
+            </a:p>
+          </p:txBody>
+        </p:sp>
+      </p:grpSp>
+      <p:sp>
+        <p:nvSpPr>
+          <p:cNvPr id="26" name="TextBox 25">
+            <a:extLst>
+              <a:ext uri="{FF2B5EF4-FFF2-40B4-BE49-F238E27FC236}">
+                <a16:creationId xmlns:a16="http://schemas.microsoft.com/office/drawing/2014/main" id="{0AA15667-E01A-603C-6D93-97D7301D4BC8}"/>
+              </a:ext>
+            </a:extLst>
+          </p:cNvPr>
+          <p:cNvSpPr txBox="1"/>
+          <p:nvPr/>
+        </p:nvSpPr>
+        <p:spPr>
+          <a:xfrm>
+            <a:off x="148578" y="8021773"/>
+            <a:ext cx="4880622" cy="343638"/>
+          </a:xfrm>
+          <a:prstGeom prst="rect">
+            <a:avLst/>
+          </a:prstGeom>
+        </p:spPr>
+        <p:txBody>
+          <a:bodyPr wrap="square" lIns="0" tIns="0" rIns="0" bIns="0" rtlCol="0">
+            <a:noAutofit/>
+          </a:bodyPr>
+          <a:lstStyle/>
+          <a:p>
+            <a:pPr>
+              <a:lnSpc>
+                <a:spcPct val="105000"/>
+              </a:lnSpc>
+              <a:spcBef>
+                <a:spcPts val="1000"/>
+              </a:spcBef>
+            </a:pPr>
+            <a:r>
+              <a:rPr lang="en-US" sz="1600" dirty="0">
+                <a:ea typeface="IBM Plex Sans" charset="0"/>
+                <a:cs typeface="IBM Plex Sans" charset="0"/>
+              </a:rPr>
+              <a:t>*</a:t>
+            </a:r>
+            <a:r>
+              <a:rPr lang="en-IL" sz="1600" dirty="0">
+                <a:ea typeface="IBM Plex Sans" charset="0"/>
+                <a:cs typeface="IBM Plex Sans" charset="0"/>
+              </a:rPr>
+              <a:t>WKC</a:t>
+            </a:r>
+            <a:r>
+              <a:rPr lang="en-US" sz="1600" dirty="0">
+                <a:ea typeface="IBM Plex Sans" charset="0"/>
+                <a:cs typeface="IBM Plex Sans" charset="0"/>
+              </a:rPr>
+              <a:t> – Watson Knowledge Catalog</a:t>
+            </a:r>
+            <a:endParaRPr lang="en-IL" sz="1600" dirty="0">
+              <a:ea typeface="IBM Plex Sans" charset="0"/>
+              <a:cs typeface="IBM Plex Sans" charset="0"/>
+            </a:endParaRPr>
+          </a:p>
+        </p:txBody>
+      </p:sp>
+      <p:sp>
+        <p:nvSpPr>
+          <p:cNvPr id="27" name="TextBox 26">
+            <a:extLst>
+              <a:ext uri="{FF2B5EF4-FFF2-40B4-BE49-F238E27FC236}">
+                <a16:creationId xmlns:a16="http://schemas.microsoft.com/office/drawing/2014/main" id="{1B40EE66-63C1-8573-1E21-1800FF61121E}"/>
+              </a:ext>
+            </a:extLst>
+          </p:cNvPr>
+          <p:cNvSpPr txBox="1"/>
+          <p:nvPr/>
+        </p:nvSpPr>
+        <p:spPr>
+          <a:xfrm>
+            <a:off x="11824688" y="4813690"/>
+            <a:ext cx="2401425" cy="775515"/>
+          </a:xfrm>
+          <a:prstGeom prst="rect">
+            <a:avLst/>
+          </a:prstGeom>
+          <a:solidFill>
+            <a:schemeClr val="accent1">
+              <a:lumMod val="20000"/>
+              <a:lumOff val="80000"/>
+            </a:schemeClr>
+          </a:solidFill>
+          <a:ln w="19050">
+            <a:solidFill>
+              <a:schemeClr val="tx1"/>
+            </a:solidFill>
+            <a:prstDash val="dash"/>
+          </a:ln>
+        </p:spPr>
+        <p:style>
+          <a:lnRef idx="2">
+            <a:schemeClr val="accent1">
+              <a:shade val="50000"/>
+            </a:schemeClr>
+          </a:lnRef>
+          <a:fillRef idx="1">
+            <a:schemeClr val="accent1"/>
+          </a:fillRef>
+          <a:effectRef idx="0">
+            <a:schemeClr val="accent1"/>
+          </a:effectRef>
+          <a:fontRef idx="minor">
+            <a:schemeClr val="lt1"/>
+          </a:fontRef>
+        </p:style>
+        <p:txBody>
+          <a:bodyPr rot="0" spcFirstLastPara="0" vertOverflow="overflow" horzOverflow="overflow" vert="horz" wrap="square" lIns="182880" tIns="91440" rIns="91440" bIns="43200" numCol="1" spcCol="0" rtlCol="0" fromWordArt="0" anchor="t" anchorCtr="0" forceAA="0" compatLnSpc="1">
+            <a:prstTxWarp prst="textNoShape">
+              <a:avLst/>
+            </a:prstTxWarp>
+            <a:noAutofit/>
+          </a:bodyPr>
+          <a:lstStyle>
+            <a:defPPr>
+              <a:defRPr lang="en-US"/>
+            </a:defPPr>
+            <a:lvl1pPr defTabSz="1097208">
+              <a:defRPr sz="1920" b="1">
+                <a:solidFill>
+                  <a:srgbClr val="0070C0"/>
+                </a:solidFill>
+                <a:latin typeface="IBM Plex Arabic" panose="020B0503050203000203" pitchFamily="34" charset="-78"/>
+                <a:cs typeface="IBM Plex Arabic" panose="020B0503050203000203" pitchFamily="34" charset="-78"/>
+              </a:defRPr>
+            </a:lvl1pPr>
+            <a:lvl2pPr>
+              <a:defRPr>
+                <a:solidFill>
+                  <a:schemeClr val="lt1"/>
+                </a:solidFill>
+              </a:defRPr>
+            </a:lvl2pPr>
+            <a:lvl3pPr>
+              <a:defRPr>
+                <a:solidFill>
+                  <a:schemeClr val="lt1"/>
+                </a:solidFill>
+              </a:defRPr>
+            </a:lvl3pPr>
+            <a:lvl4pPr>
+              <a:defRPr>
+                <a:solidFill>
+                  <a:schemeClr val="lt1"/>
+                </a:solidFill>
+              </a:defRPr>
+            </a:lvl4pPr>
+            <a:lvl5pPr>
+              <a:defRPr>
+                <a:solidFill>
+                  <a:schemeClr val="lt1"/>
+                </a:solidFill>
+              </a:defRPr>
+            </a:lvl5pPr>
+            <a:lvl6pPr>
+              <a:defRPr>
+                <a:solidFill>
+                  <a:schemeClr val="lt1"/>
+                </a:solidFill>
+              </a:defRPr>
+            </a:lvl6pPr>
+            <a:lvl7pPr>
+              <a:defRPr>
+                <a:solidFill>
+                  <a:schemeClr val="lt1"/>
+                </a:solidFill>
+              </a:defRPr>
+            </a:lvl7pPr>
+            <a:lvl8pPr>
+              <a:defRPr>
+                <a:solidFill>
+                  <a:schemeClr val="lt1"/>
+                </a:solidFill>
+              </a:defRPr>
+            </a:lvl8pPr>
+            <a:lvl9pPr>
+              <a:defRPr>
+                <a:solidFill>
+                  <a:schemeClr val="lt1"/>
+                </a:solidFill>
+              </a:defRPr>
+            </a:lvl9pPr>
+          </a:lstStyle>
+          <a:p>
+            <a:pPr algn="ctr"/>
+            <a:r>
+              <a:rPr lang="en-US" sz="2000" b="0" dirty="0">
+                <a:latin typeface="+mn-lt"/>
+              </a:rPr>
+              <a:t>Available Storage Accounts</a:t>
+            </a:r>
+          </a:p>
+        </p:txBody>
+      </p:sp>
+      <p:sp>
+        <p:nvSpPr>
+          <p:cNvPr id="28" name="Rectangle 27">
+            <a:extLst>
+              <a:ext uri="{FF2B5EF4-FFF2-40B4-BE49-F238E27FC236}">
+                <a16:creationId xmlns:a16="http://schemas.microsoft.com/office/drawing/2014/main" id="{32AF36C2-849E-D8AE-CE89-14D87BA96C02}"/>
+              </a:ext>
+            </a:extLst>
+          </p:cNvPr>
+          <p:cNvSpPr/>
+          <p:nvPr/>
+        </p:nvSpPr>
+        <p:spPr>
+          <a:xfrm>
+            <a:off x="-73654" y="70518"/>
+            <a:ext cx="5096111" cy="612360"/>
+          </a:xfrm>
+          <a:prstGeom prst="rect">
+            <a:avLst/>
+          </a:prstGeom>
+          <a:noFill/>
+          <a:ln>
+            <a:noFill/>
+          </a:ln>
+        </p:spPr>
+        <p:style>
+          <a:lnRef idx="2">
+            <a:schemeClr val="accent1">
+              <a:shade val="50000"/>
+            </a:schemeClr>
+          </a:lnRef>
+          <a:fillRef idx="1">
+            <a:schemeClr val="accent1"/>
+          </a:fillRef>
+          <a:effectRef idx="0">
+            <a:schemeClr val="accent1"/>
+          </a:effectRef>
+          <a:fontRef idx="minor">
+            <a:schemeClr val="lt1"/>
+          </a:fontRef>
+        </p:style>
+        <p:txBody>
+          <a:bodyPr rot="0" spcFirstLastPara="0" vertOverflow="overflow" horzOverflow="overflow" vert="horz" wrap="square" lIns="91440" tIns="45720" rIns="91440" bIns="45720" numCol="1" spcCol="0" rtlCol="0" fromWordArt="0" anchor="ctr" anchorCtr="0" forceAA="0" compatLnSpc="1">
+            <a:prstTxWarp prst="textNoShape">
+              <a:avLst/>
+            </a:prstTxWarp>
+            <a:noAutofit/>
+          </a:bodyPr>
+          <a:lstStyle/>
+          <a:p>
+            <a:pPr algn="ctr"/>
+            <a:r>
+              <a:rPr lang="en-US" sz="3200" dirty="0">
+                <a:solidFill>
+                  <a:schemeClr val="bg2"/>
+                </a:solidFill>
+              </a:rPr>
+              <a:t>Fybrik Open Architecture</a:t>
+            </a:r>
+          </a:p>
+        </p:txBody>
+      </p:sp>
+      <p:sp>
+        <p:nvSpPr>
+          <p:cNvPr id="33" name="TextBox 32">
+            <a:extLst>
+              <a:ext uri="{FF2B5EF4-FFF2-40B4-BE49-F238E27FC236}">
+                <a16:creationId xmlns:a16="http://schemas.microsoft.com/office/drawing/2014/main" id="{F17B8EFB-C90F-E72F-6D92-324ABC30783C}"/>
+              </a:ext>
+            </a:extLst>
+          </p:cNvPr>
+          <p:cNvSpPr txBox="1"/>
+          <p:nvPr/>
+        </p:nvSpPr>
+        <p:spPr>
+          <a:xfrm>
+            <a:off x="11824688" y="5896907"/>
+            <a:ext cx="2401425" cy="482605"/>
+          </a:xfrm>
+          <a:prstGeom prst="rect">
+            <a:avLst/>
+          </a:prstGeom>
+          <a:solidFill>
+            <a:schemeClr val="accent1">
+              <a:lumMod val="20000"/>
+              <a:lumOff val="80000"/>
+            </a:schemeClr>
+          </a:solidFill>
+          <a:ln w="19050">
+            <a:solidFill>
+              <a:schemeClr val="tx1"/>
+            </a:solidFill>
+            <a:prstDash val="dash"/>
+          </a:ln>
+        </p:spPr>
+        <p:style>
+          <a:lnRef idx="2">
+            <a:schemeClr val="accent1">
+              <a:shade val="50000"/>
+            </a:schemeClr>
+          </a:lnRef>
+          <a:fillRef idx="1">
+            <a:schemeClr val="accent1"/>
+          </a:fillRef>
+          <a:effectRef idx="0">
+            <a:schemeClr val="accent1"/>
+          </a:effectRef>
+          <a:fontRef idx="minor">
+            <a:schemeClr val="lt1"/>
+          </a:fontRef>
+        </p:style>
+        <p:txBody>
+          <a:bodyPr rot="0" spcFirstLastPara="0" vertOverflow="overflow" horzOverflow="overflow" vert="horz" wrap="square" lIns="182880" tIns="91440" rIns="91440" bIns="43200" numCol="1" spcCol="0" rtlCol="0" fromWordArt="0" anchor="t" anchorCtr="0" forceAA="0" compatLnSpc="1">
+            <a:prstTxWarp prst="textNoShape">
+              <a:avLst/>
+            </a:prstTxWarp>
+            <a:noAutofit/>
+          </a:bodyPr>
+          <a:lstStyle>
+            <a:defPPr>
+              <a:defRPr lang="en-US"/>
+            </a:defPPr>
+            <a:lvl1pPr defTabSz="1097208">
+              <a:defRPr sz="1920" b="1">
+                <a:solidFill>
+                  <a:srgbClr val="0070C0"/>
+                </a:solidFill>
+                <a:latin typeface="IBM Plex Arabic" panose="020B0503050203000203" pitchFamily="34" charset="-78"/>
+                <a:cs typeface="IBM Plex Arabic" panose="020B0503050203000203" pitchFamily="34" charset="-78"/>
+              </a:defRPr>
+            </a:lvl1pPr>
+            <a:lvl2pPr>
+              <a:defRPr>
+                <a:solidFill>
+                  <a:schemeClr val="lt1"/>
+                </a:solidFill>
+              </a:defRPr>
+            </a:lvl2pPr>
+            <a:lvl3pPr>
+              <a:defRPr>
+                <a:solidFill>
+                  <a:schemeClr val="lt1"/>
+                </a:solidFill>
+              </a:defRPr>
+            </a:lvl3pPr>
+            <a:lvl4pPr>
+              <a:defRPr>
+                <a:solidFill>
+                  <a:schemeClr val="lt1"/>
+                </a:solidFill>
+              </a:defRPr>
+            </a:lvl4pPr>
+            <a:lvl5pPr>
+              <a:defRPr>
+                <a:solidFill>
+                  <a:schemeClr val="lt1"/>
+                </a:solidFill>
+              </a:defRPr>
+            </a:lvl5pPr>
+            <a:lvl6pPr>
+              <a:defRPr>
+                <a:solidFill>
+                  <a:schemeClr val="lt1"/>
+                </a:solidFill>
+              </a:defRPr>
+            </a:lvl6pPr>
+            <a:lvl7pPr>
+              <a:defRPr>
+                <a:solidFill>
+                  <a:schemeClr val="lt1"/>
+                </a:solidFill>
+              </a:defRPr>
+            </a:lvl7pPr>
+            <a:lvl8pPr>
+              <a:defRPr>
+                <a:solidFill>
+                  <a:schemeClr val="lt1"/>
+                </a:solidFill>
+              </a:defRPr>
+            </a:lvl8pPr>
+            <a:lvl9pPr>
+              <a:defRPr>
+                <a:solidFill>
+                  <a:schemeClr val="lt1"/>
+                </a:solidFill>
+              </a:defRPr>
+            </a:lvl9pPr>
+          </a:lstStyle>
+          <a:p>
+            <a:pPr algn="ctr"/>
+            <a:r>
+              <a:rPr lang="en-US" sz="2000" b="0" dirty="0">
+                <a:latin typeface="+mn-lt"/>
+              </a:rPr>
+              <a:t>IT attributes</a:t>
+            </a:r>
+          </a:p>
+        </p:txBody>
+      </p:sp>
+      <p:sp>
+        <p:nvSpPr>
+          <p:cNvPr id="34" name="TextBox 33">
+            <a:extLst>
+              <a:ext uri="{FF2B5EF4-FFF2-40B4-BE49-F238E27FC236}">
+                <a16:creationId xmlns:a16="http://schemas.microsoft.com/office/drawing/2014/main" id="{AE3EDA12-4C20-2DF3-BA54-730B71F1D719}"/>
+              </a:ext>
+            </a:extLst>
+          </p:cNvPr>
+          <p:cNvSpPr txBox="1"/>
+          <p:nvPr/>
+        </p:nvSpPr>
+        <p:spPr>
+          <a:xfrm>
+            <a:off x="11808702" y="6670588"/>
+            <a:ext cx="2401425" cy="775515"/>
+          </a:xfrm>
+          <a:prstGeom prst="rect">
+            <a:avLst/>
+          </a:prstGeom>
+          <a:solidFill>
+            <a:schemeClr val="accent1">
+              <a:lumMod val="20000"/>
+              <a:lumOff val="80000"/>
+            </a:schemeClr>
+          </a:solidFill>
+          <a:ln w="19050">
+            <a:solidFill>
+              <a:schemeClr val="tx1"/>
+            </a:solidFill>
+            <a:prstDash val="dash"/>
+          </a:ln>
+        </p:spPr>
+        <p:style>
+          <a:lnRef idx="2">
+            <a:schemeClr val="accent1">
+              <a:shade val="50000"/>
+            </a:schemeClr>
+          </a:lnRef>
+          <a:fillRef idx="1">
+            <a:schemeClr val="accent1"/>
+          </a:fillRef>
+          <a:effectRef idx="0">
+            <a:schemeClr val="accent1"/>
+          </a:effectRef>
+          <a:fontRef idx="minor">
+            <a:schemeClr val="lt1"/>
+          </a:fontRef>
+        </p:style>
+        <p:txBody>
+          <a:bodyPr rot="0" spcFirstLastPara="0" vertOverflow="overflow" horzOverflow="overflow" vert="horz" wrap="square" lIns="182880" tIns="91440" rIns="91440" bIns="43200" numCol="1" spcCol="0" rtlCol="0" fromWordArt="0" anchor="t" anchorCtr="0" forceAA="0" compatLnSpc="1">
+            <a:prstTxWarp prst="textNoShape">
+              <a:avLst/>
+            </a:prstTxWarp>
+            <a:noAutofit/>
+          </a:bodyPr>
+          <a:lstStyle>
+            <a:defPPr>
+              <a:defRPr lang="en-US"/>
+            </a:defPPr>
+            <a:lvl1pPr defTabSz="1097208">
+              <a:defRPr sz="1920" b="1">
+                <a:solidFill>
+                  <a:srgbClr val="0070C0"/>
+                </a:solidFill>
+                <a:latin typeface="IBM Plex Arabic" panose="020B0503050203000203" pitchFamily="34" charset="-78"/>
+                <a:cs typeface="IBM Plex Arabic" panose="020B0503050203000203" pitchFamily="34" charset="-78"/>
+              </a:defRPr>
+            </a:lvl1pPr>
+            <a:lvl2pPr>
+              <a:defRPr>
+                <a:solidFill>
+                  <a:schemeClr val="lt1"/>
+                </a:solidFill>
+              </a:defRPr>
+            </a:lvl2pPr>
+            <a:lvl3pPr>
+              <a:defRPr>
+                <a:solidFill>
+                  <a:schemeClr val="lt1"/>
+                </a:solidFill>
+              </a:defRPr>
+            </a:lvl3pPr>
+            <a:lvl4pPr>
+              <a:defRPr>
+                <a:solidFill>
+                  <a:schemeClr val="lt1"/>
+                </a:solidFill>
+              </a:defRPr>
+            </a:lvl4pPr>
+            <a:lvl5pPr>
+              <a:defRPr>
+                <a:solidFill>
+                  <a:schemeClr val="lt1"/>
+                </a:solidFill>
+              </a:defRPr>
+            </a:lvl5pPr>
+            <a:lvl6pPr>
+              <a:defRPr>
+                <a:solidFill>
+                  <a:schemeClr val="lt1"/>
+                </a:solidFill>
+              </a:defRPr>
+            </a:lvl6pPr>
+            <a:lvl7pPr>
+              <a:defRPr>
+                <a:solidFill>
+                  <a:schemeClr val="lt1"/>
+                </a:solidFill>
+              </a:defRPr>
+            </a:lvl7pPr>
+            <a:lvl8pPr>
+              <a:defRPr>
+                <a:solidFill>
+                  <a:schemeClr val="lt1"/>
+                </a:solidFill>
+              </a:defRPr>
+            </a:lvl8pPr>
+            <a:lvl9pPr>
+              <a:defRPr>
+                <a:solidFill>
+                  <a:schemeClr val="lt1"/>
+                </a:solidFill>
+              </a:defRPr>
+            </a:lvl9pPr>
+          </a:lstStyle>
+          <a:p>
+            <a:pPr algn="ctr"/>
+            <a:r>
+              <a:rPr lang="en-US" sz="2000" b="0" dirty="0">
+                <a:latin typeface="+mn-lt"/>
+              </a:rPr>
+              <a:t>IT Config Policies (Rego)</a:t>
+            </a:r>
+          </a:p>
+        </p:txBody>
+      </p:sp>
+      <p:sp>
+        <p:nvSpPr>
+          <p:cNvPr id="39" name="TextBox 38">
+            <a:extLst>
+              <a:ext uri="{FF2B5EF4-FFF2-40B4-BE49-F238E27FC236}">
+                <a16:creationId xmlns:a16="http://schemas.microsoft.com/office/drawing/2014/main" id="{2355C9EE-7F19-33C6-2284-9F0B475AA34B}"/>
+              </a:ext>
+            </a:extLst>
+          </p:cNvPr>
+          <p:cNvSpPr txBox="1"/>
+          <p:nvPr/>
+        </p:nvSpPr>
+        <p:spPr>
+          <a:xfrm>
+            <a:off x="8454361" y="5589205"/>
+            <a:ext cx="2043343" cy="539874"/>
+          </a:xfrm>
+          <a:prstGeom prst="rect">
+            <a:avLst/>
+          </a:prstGeom>
+          <a:solidFill>
+            <a:srgbClr val="0070C0"/>
+          </a:solidFill>
+          <a:ln w="38100">
+            <a:solidFill>
+              <a:srgbClr val="525252"/>
+            </a:solidFill>
+          </a:ln>
+        </p:spPr>
+        <p:txBody>
+          <a:bodyPr wrap="square" rtlCol="0" anchor="ctr">
+            <a:noAutofit/>
+          </a:bodyPr>
+          <a:lstStyle/>
+          <a:p>
+            <a:pPr algn="ctr"/>
+            <a:r>
+              <a:rPr lang="en-US" sz="1800" dirty="0">
+                <a:solidFill>
+                  <a:schemeClr val="bg2"/>
+                </a:solidFill>
+              </a:rPr>
+              <a:t>IT Config Policy </a:t>
+            </a:r>
+            <a:r>
+              <a:rPr lang="en-US" sz="1800" dirty="0" err="1">
+                <a:solidFill>
+                  <a:schemeClr val="bg2"/>
+                </a:solidFill>
+              </a:rPr>
+              <a:t>Mgr</a:t>
+            </a:r>
+            <a:endParaRPr lang="en-US" sz="1800" dirty="0">
+              <a:solidFill>
+                <a:schemeClr val="bg2"/>
+              </a:solidFill>
+            </a:endParaRPr>
+          </a:p>
+        </p:txBody>
+      </p:sp>
+      <p:cxnSp>
+        <p:nvCxnSpPr>
+          <p:cNvPr id="40" name="Straight Arrow Connector 39">
+            <a:extLst>
+              <a:ext uri="{FF2B5EF4-FFF2-40B4-BE49-F238E27FC236}">
+                <a16:creationId xmlns:a16="http://schemas.microsoft.com/office/drawing/2014/main" id="{137C4976-5ECB-6DFA-1655-F11136FB66CE}"/>
+              </a:ext>
+            </a:extLst>
+          </p:cNvPr>
+          <p:cNvCxnSpPr>
+            <a:cxnSpLocks/>
+          </p:cNvCxnSpPr>
+          <p:nvPr/>
+        </p:nvCxnSpPr>
+        <p:spPr>
+          <a:xfrm flipH="1" flipV="1">
+            <a:off x="10348888" y="5040163"/>
+            <a:ext cx="1459814" cy="148810"/>
+          </a:xfrm>
+          <a:prstGeom prst="straightConnector1">
+            <a:avLst/>
+          </a:prstGeom>
+          <a:ln w="38100">
+            <a:solidFill>
+              <a:srgbClr val="D7306D"/>
+            </a:solidFill>
+            <a:tailEnd type="triangle"/>
+          </a:ln>
+        </p:spPr>
+        <p:style>
+          <a:lnRef idx="1">
+            <a:schemeClr val="accent1"/>
+          </a:lnRef>
+          <a:fillRef idx="0">
+            <a:schemeClr val="accent1"/>
+          </a:fillRef>
+          <a:effectRef idx="0">
+            <a:schemeClr val="accent1"/>
+          </a:effectRef>
+          <a:fontRef idx="minor">
+            <a:schemeClr val="tx1"/>
+          </a:fontRef>
+        </p:style>
+      </p:cxnSp>
+      <p:cxnSp>
+        <p:nvCxnSpPr>
+          <p:cNvPr id="42" name="Straight Arrow Connector 41">
+            <a:extLst>
+              <a:ext uri="{FF2B5EF4-FFF2-40B4-BE49-F238E27FC236}">
+                <a16:creationId xmlns:a16="http://schemas.microsoft.com/office/drawing/2014/main" id="{F7C825FC-C1A1-21B2-D578-6BFA0274EBAC}"/>
+              </a:ext>
+            </a:extLst>
+          </p:cNvPr>
+          <p:cNvCxnSpPr>
+            <a:cxnSpLocks/>
+          </p:cNvCxnSpPr>
+          <p:nvPr/>
+        </p:nvCxnSpPr>
+        <p:spPr>
+          <a:xfrm flipH="1" flipV="1">
+            <a:off x="10348888" y="5166388"/>
+            <a:ext cx="1472662" cy="951209"/>
+          </a:xfrm>
+          <a:prstGeom prst="straightConnector1">
+            <a:avLst/>
+          </a:prstGeom>
+          <a:ln w="38100">
+            <a:solidFill>
+              <a:srgbClr val="D7306D"/>
+            </a:solidFill>
+            <a:tailEnd type="triangle"/>
+          </a:ln>
+        </p:spPr>
+        <p:style>
+          <a:lnRef idx="1">
+            <a:schemeClr val="accent1"/>
+          </a:lnRef>
+          <a:fillRef idx="0">
+            <a:schemeClr val="accent1"/>
+          </a:fillRef>
+          <a:effectRef idx="0">
+            <a:schemeClr val="accent1"/>
+          </a:effectRef>
+          <a:fontRef idx="minor">
+            <a:schemeClr val="tx1"/>
+          </a:fontRef>
+        </p:style>
+      </p:cxnSp>
+      <p:cxnSp>
+        <p:nvCxnSpPr>
+          <p:cNvPr id="44" name="Straight Arrow Connector 43">
+            <a:extLst>
+              <a:ext uri="{FF2B5EF4-FFF2-40B4-BE49-F238E27FC236}">
+                <a16:creationId xmlns:a16="http://schemas.microsoft.com/office/drawing/2014/main" id="{7E1280EF-244A-9D36-5437-D37088681CBC}"/>
+              </a:ext>
+            </a:extLst>
+          </p:cNvPr>
+          <p:cNvCxnSpPr>
+            <a:cxnSpLocks/>
+            <a:stCxn id="34" idx="1"/>
+          </p:cNvCxnSpPr>
+          <p:nvPr/>
+        </p:nvCxnSpPr>
+        <p:spPr>
+          <a:xfrm flipH="1" flipV="1">
+            <a:off x="9876245" y="6271010"/>
+            <a:ext cx="1932457" cy="787336"/>
+          </a:xfrm>
+          <a:prstGeom prst="straightConnector1">
+            <a:avLst/>
+          </a:prstGeom>
+          <a:ln w="38100">
+            <a:solidFill>
+              <a:srgbClr val="D7306D"/>
+            </a:solidFill>
+            <a:tailEnd type="triangle"/>
+          </a:ln>
+        </p:spPr>
+        <p:style>
+          <a:lnRef idx="1">
+            <a:schemeClr val="accent1"/>
+          </a:lnRef>
+          <a:fillRef idx="0">
+            <a:schemeClr val="accent1"/>
+          </a:fillRef>
+          <a:effectRef idx="0">
+            <a:schemeClr val="accent1"/>
+          </a:effectRef>
+          <a:fontRef idx="minor">
+            <a:schemeClr val="tx1"/>
+          </a:fontRef>
+        </p:style>
+      </p:cxnSp>
+      <p:sp>
+        <p:nvSpPr>
+          <p:cNvPr id="47" name="TextBox 46">
+            <a:extLst>
+              <a:ext uri="{FF2B5EF4-FFF2-40B4-BE49-F238E27FC236}">
+                <a16:creationId xmlns:a16="http://schemas.microsoft.com/office/drawing/2014/main" id="{9F7D4114-83A1-2E3F-2B30-A4E8109D9CD8}"/>
+              </a:ext>
+            </a:extLst>
+          </p:cNvPr>
+          <p:cNvSpPr txBox="1"/>
+          <p:nvPr/>
+        </p:nvSpPr>
+        <p:spPr>
+          <a:xfrm>
+            <a:off x="9036628" y="6154973"/>
+            <a:ext cx="819594" cy="273070"/>
+          </a:xfrm>
+          <a:prstGeom prst="rect">
+            <a:avLst/>
+          </a:prstGeom>
+          <a:solidFill>
+            <a:srgbClr val="0070C0"/>
+          </a:solidFill>
+          <a:ln w="38100">
+            <a:solidFill>
+              <a:srgbClr val="525252"/>
+            </a:solidFill>
+          </a:ln>
+        </p:spPr>
+        <p:txBody>
+          <a:bodyPr wrap="square" rtlCol="0" anchor="ctr">
+            <a:noAutofit/>
+          </a:bodyPr>
+          <a:lstStyle/>
+          <a:p>
+            <a:pPr algn="ctr"/>
+            <a:r>
+              <a:rPr lang="en-US" sz="1800" dirty="0">
+                <a:solidFill>
+                  <a:schemeClr val="bg2"/>
+                </a:solidFill>
+              </a:rPr>
+              <a:t>OPA</a:t>
+            </a:r>
+          </a:p>
+        </p:txBody>
+      </p:sp>
+      <p:cxnSp>
+        <p:nvCxnSpPr>
+          <p:cNvPr id="51" name="Straight Arrow Connector 50">
+            <a:extLst>
+              <a:ext uri="{FF2B5EF4-FFF2-40B4-BE49-F238E27FC236}">
+                <a16:creationId xmlns:a16="http://schemas.microsoft.com/office/drawing/2014/main" id="{DDBDD1A0-9D0E-3F22-A9AA-1A2308520639}"/>
+              </a:ext>
+            </a:extLst>
+          </p:cNvPr>
+          <p:cNvCxnSpPr>
+            <a:cxnSpLocks/>
+          </p:cNvCxnSpPr>
+          <p:nvPr/>
+        </p:nvCxnSpPr>
+        <p:spPr>
+          <a:xfrm flipV="1">
+            <a:off x="9372483" y="5218122"/>
+            <a:ext cx="5808" cy="340008"/>
+          </a:xfrm>
+          <a:prstGeom prst="straightConnector1">
+            <a:avLst/>
+          </a:prstGeom>
+          <a:ln w="38100">
+            <a:solidFill>
+              <a:srgbClr val="D7306D"/>
+            </a:solidFill>
+            <a:tailEnd type="triangle"/>
+          </a:ln>
+        </p:spPr>
+        <p:style>
+          <a:lnRef idx="1">
+            <a:schemeClr val="accent1"/>
+          </a:lnRef>
+          <a:fillRef idx="0">
+            <a:schemeClr val="accent1"/>
+          </a:fillRef>
+          <a:effectRef idx="0">
+            <a:schemeClr val="accent1"/>
+          </a:effectRef>
+          <a:fontRef idx="minor">
+            <a:schemeClr val="tx1"/>
+          </a:fontRef>
+        </p:style>
+      </p:cxnSp>
+      <p:pic>
+        <p:nvPicPr>
+          <p:cNvPr id="19" name="Picture 18">
+            <a:extLst>
+              <a:ext uri="{FF2B5EF4-FFF2-40B4-BE49-F238E27FC236}">
+                <a16:creationId xmlns:a16="http://schemas.microsoft.com/office/drawing/2014/main" id="{9E4043C8-100A-92A9-65E0-9CCACF828D58}"/>
+              </a:ext>
+            </a:extLst>
+          </p:cNvPr>
+          <p:cNvPicPr>
+            <a:picLocks noChangeAspect="1"/>
+          </p:cNvPicPr>
+          <p:nvPr/>
+        </p:nvPicPr>
+        <p:blipFill>
+          <a:blip r:embed="rId12"/>
+          <a:stretch>
+            <a:fillRect/>
+          </a:stretch>
+        </p:blipFill>
+        <p:spPr>
+          <a:xfrm>
+            <a:off x="10082181" y="2116102"/>
+            <a:ext cx="226890" cy="421033"/>
+          </a:xfrm>
+          <a:prstGeom prst="rect">
+            <a:avLst/>
+          </a:prstGeom>
+        </p:spPr>
+      </p:pic>
+      <p:sp>
+        <p:nvSpPr>
+          <p:cNvPr id="20" name="Rectangle 19">
+            <a:extLst>
+              <a:ext uri="{FF2B5EF4-FFF2-40B4-BE49-F238E27FC236}">
+                <a16:creationId xmlns:a16="http://schemas.microsoft.com/office/drawing/2014/main" id="{9F4FB397-93DC-CE25-005C-ECD4A6F6F177}"/>
+              </a:ext>
+            </a:extLst>
+          </p:cNvPr>
+          <p:cNvSpPr/>
+          <p:nvPr/>
+        </p:nvSpPr>
+        <p:spPr>
+          <a:xfrm>
+            <a:off x="9448799" y="1743552"/>
+            <a:ext cx="1531189" cy="327469"/>
+          </a:xfrm>
+          <a:prstGeom prst="rect">
+            <a:avLst/>
+          </a:prstGeom>
+          <a:solidFill>
+            <a:srgbClr val="92D050"/>
+          </a:solidFill>
+          <a:ln>
+            <a:noFill/>
+          </a:ln>
+        </p:spPr>
+        <p:style>
+          <a:lnRef idx="2">
+            <a:schemeClr val="accent1">
+              <a:shade val="50000"/>
+            </a:schemeClr>
+          </a:lnRef>
+          <a:fillRef idx="1">
+            <a:schemeClr val="accent1"/>
+          </a:fillRef>
+          <a:effectRef idx="0">
+            <a:schemeClr val="accent1"/>
+          </a:effectRef>
+          <a:fontRef idx="minor">
+            <a:schemeClr val="lt1"/>
+          </a:fontRef>
+        </p:style>
+        <p:txBody>
+          <a:bodyPr rot="0" spcFirstLastPara="0" vertOverflow="overflow" horzOverflow="overflow" vert="horz" wrap="square" lIns="91440" tIns="45720" rIns="91440" bIns="45720" numCol="1" spcCol="0" rtlCol="0" fromWordArt="0" anchor="ctr" anchorCtr="0" forceAA="0" compatLnSpc="1">
+            <a:prstTxWarp prst="textNoShape">
+              <a:avLst/>
+            </a:prstTxWarp>
+            <a:noAutofit/>
+          </a:bodyPr>
+          <a:lstStyle/>
+          <a:p>
+            <a:pPr algn="ctr"/>
+            <a:r>
+              <a:rPr lang="en-US" sz="1200" b="1" dirty="0" err="1"/>
+              <a:t>FybrikApplication</a:t>
+            </a:r>
+            <a:br>
+              <a:rPr lang="en-US" sz="1200" b="1" dirty="0"/>
+            </a:br>
+            <a:r>
+              <a:rPr lang="en-US" sz="1200" b="1" dirty="0"/>
+              <a:t>YAML</a:t>
+            </a:r>
+          </a:p>
+        </p:txBody>
+      </p:sp>
+      <p:cxnSp>
+        <p:nvCxnSpPr>
+          <p:cNvPr id="22" name="Straight Arrow Connector 21">
+            <a:extLst>
+              <a:ext uri="{FF2B5EF4-FFF2-40B4-BE49-F238E27FC236}">
+                <a16:creationId xmlns:a16="http://schemas.microsoft.com/office/drawing/2014/main" id="{7D7E0C9E-31FA-AE96-D9DD-C00C9FCDDB92}"/>
+              </a:ext>
+            </a:extLst>
+          </p:cNvPr>
+          <p:cNvCxnSpPr>
+            <a:cxnSpLocks/>
+            <a:stCxn id="19" idx="2"/>
+          </p:cNvCxnSpPr>
+          <p:nvPr/>
+        </p:nvCxnSpPr>
+        <p:spPr>
+          <a:xfrm>
+            <a:off x="10195626" y="2537135"/>
+            <a:ext cx="6408" cy="1526734"/>
+          </a:xfrm>
+          <a:prstGeom prst="straightConnector1">
+            <a:avLst/>
+          </a:prstGeom>
+          <a:ln w="38100">
+            <a:solidFill>
+              <a:srgbClr val="D7306D"/>
+            </a:solidFill>
+            <a:tailEnd type="triangle"/>
+          </a:ln>
+        </p:spPr>
+        <p:style>
+          <a:lnRef idx="1">
+            <a:schemeClr val="accent1"/>
+          </a:lnRef>
+          <a:fillRef idx="0">
+            <a:schemeClr val="accent1"/>
+          </a:fillRef>
+          <a:effectRef idx="0">
+            <a:schemeClr val="accent1"/>
+          </a:effectRef>
+          <a:fontRef idx="minor">
+            <a:schemeClr val="tx1"/>
+          </a:fontRef>
+        </p:style>
+      </p:cxnSp>
     </p:spTree>
     <p:extLst>
       <p:ext uri="{BB962C8B-B14F-4D97-AF65-F5344CB8AC3E}">

</xml_diff>